<commit_message>
loading CSV from zip files
</commit_message>
<xml_diff>
--- a/Lending Club Case Study.pptx
+++ b/Lending Club Case Study.pptx
@@ -5,7 +5,7 @@
     <p:sldMasterId id="2147483648" r:id="rId1"/>
   </p:sldMasterIdLst>
   <p:notesMasterIdLst>
-    <p:notesMasterId r:id="rId36"/>
+    <p:notesMasterId r:id="rId38"/>
   </p:notesMasterIdLst>
   <p:sldIdLst>
     <p:sldId id="256" r:id="rId2"/>
@@ -37,11 +37,13 @@
     <p:sldId id="282" r:id="rId28"/>
     <p:sldId id="283" r:id="rId29"/>
     <p:sldId id="284" r:id="rId30"/>
-    <p:sldId id="285" r:id="rId31"/>
-    <p:sldId id="286" r:id="rId32"/>
-    <p:sldId id="287" r:id="rId33"/>
-    <p:sldId id="288" r:id="rId34"/>
-    <p:sldId id="289" r:id="rId35"/>
+    <p:sldId id="291" r:id="rId31"/>
+    <p:sldId id="285" r:id="rId32"/>
+    <p:sldId id="286" r:id="rId33"/>
+    <p:sldId id="287" r:id="rId34"/>
+    <p:sldId id="290" r:id="rId35"/>
+    <p:sldId id="288" r:id="rId36"/>
+    <p:sldId id="289" r:id="rId37"/>
   </p:sldIdLst>
   <p:sldSz cx="12193588" cy="6858000"/>
   <p:notesSz cx="6858000" cy="9144000"/>
@@ -232,6 +234,7 @@
 <p1510:revInfo xmlns:a="http://schemas.openxmlformats.org/drawingml/2006/main" xmlns:r="http://schemas.openxmlformats.org/officeDocument/2006/relationships" xmlns:p1510="http://schemas.microsoft.com/office/powerpoint/2015/10/main">
   <p1510:revLst>
     <p1510:client id="{1FA4D976-7B1C-4F3E-9765-3891C6100643}" v="15" dt="2022-08-10T09:51:37.145"/>
+    <p1510:client id="{4CAD056A-7FB4-420E-824F-C42C9AB5CB9F}" v="185" dt="2022-08-10T14:26:56.909"/>
     <p1510:client id="{64DF12C4-01C1-47B2-BEEC-2204AEEFEFCD}" v="329" dt="2022-08-10T09:48:59.132"/>
     <p1510:client id="{C2950585-56A5-4047-9806-A742F85A2485}" v="326" dt="2022-08-10T12:13:27.534"/>
     <p1510:client id="{F983DF17-E701-4EC9-ADF2-7CC59E7C3E22}" v="285" dt="2022-08-10T11:45:49.608"/>
@@ -19874,7 +19877,7 @@
           <a:lstStyle/>
           <a:p>
             <a:r>
-              <a:rPr lang="en-US" sz="1400">
+              <a:rPr lang="en-US" sz="1400" dirty="0">
                 <a:solidFill>
                   <a:schemeClr val="tx1"/>
                 </a:solidFill>
@@ -19885,7 +19888,7 @@
               <a:t>According to the </a:t>
             </a:r>
             <a:r>
-              <a:rPr lang="en-US" sz="1400" b="1">
+              <a:rPr lang="en-US" sz="1400" b="1" dirty="0">
                 <a:solidFill>
                   <a:schemeClr val="tx1"/>
                 </a:solidFill>
@@ -19896,7 +19899,7 @@
               <a:t>Loan Purpose to Loan Status</a:t>
             </a:r>
             <a:r>
-              <a:rPr lang="en-US" sz="1400">
+              <a:rPr lang="en-US" sz="1400" dirty="0">
                 <a:solidFill>
                   <a:schemeClr val="tx1"/>
                 </a:solidFill>
@@ -19907,15 +19910,12 @@
               <a:t>, we can conclude the following,</a:t>
             </a:r>
             <a:br>
-              <a:rPr lang="en-US" sz="1400">
-                <a:solidFill>
-                  <a:schemeClr val="tx1"/>
-                </a:solidFill>
+              <a:rPr lang="en-US" sz="1400" dirty="0">
                 <a:cs typeface="Calibri"/>
               </a:rPr>
             </a:br>
             <a:r>
-              <a:rPr lang="en-US" sz="1400">
+              <a:rPr lang="en-US" sz="1400" dirty="0">
                 <a:solidFill>
                   <a:schemeClr val="tx1"/>
                 </a:solidFill>
@@ -19926,7 +19926,7 @@
               <a:t>    - Most of the loans </a:t>
             </a:r>
             <a:r>
-              <a:rPr lang="en-US" sz="1400" b="1">
+              <a:rPr lang="en-US" sz="1400" b="1" dirty="0">
                 <a:solidFill>
                   <a:schemeClr val="tx1"/>
                 </a:solidFill>
@@ -19937,7 +19937,7 @@
               <a:t>Charged Off</a:t>
             </a:r>
             <a:r>
-              <a:rPr lang="en-US" sz="1400">
+              <a:rPr lang="en-US" sz="1400" dirty="0">
                 <a:solidFill>
                   <a:schemeClr val="tx1"/>
                 </a:solidFill>
@@ -19945,9 +19945,9 @@
                 <a:ea typeface="Microsoft YaHei"/>
                 <a:cs typeface="Calibri"/>
               </a:rPr>
-              <a:t> were borrowed for House purposes</a:t>
-            </a:r>
-            <a:endParaRPr lang="en-US">
+              <a:t> were borrowed for small business purposes </a:t>
+            </a:r>
+            <a:endParaRPr lang="en-US" dirty="0">
               <a:solidFill>
                 <a:schemeClr val="tx1"/>
               </a:solidFill>
@@ -20803,6 +20803,625 @@
 </file>
 
 <file path=ppt/slides/slide30.xml><?xml version="1.0" encoding="utf-8"?>
+<p:sld xmlns:a="http://schemas.openxmlformats.org/drawingml/2006/main" xmlns:r="http://schemas.openxmlformats.org/officeDocument/2006/relationships" xmlns:p="http://schemas.openxmlformats.org/presentationml/2006/main">
+  <p:cSld>
+    <p:bg>
+      <p:bgPr>
+        <a:solidFill>
+          <a:schemeClr val="bg1"/>
+        </a:solidFill>
+        <a:effectLst/>
+      </p:bgPr>
+    </p:bg>
+    <p:spTree>
+      <p:nvGrpSpPr>
+        <p:cNvPr id="1" name=""/>
+        <p:cNvGrpSpPr/>
+        <p:nvPr/>
+      </p:nvGrpSpPr>
+      <p:grpSpPr>
+        <a:xfrm>
+          <a:off x="0" y="0"/>
+          <a:ext cx="0" cy="0"/>
+          <a:chOff x="0" y="0"/>
+          <a:chExt cx="0" cy="0"/>
+        </a:xfrm>
+      </p:grpSpPr>
+      <p:sp>
+        <p:nvSpPr>
+          <p:cNvPr id="9" name="Down Arrow 7">
+            <a:extLst>
+              <a:ext uri="{FF2B5EF4-FFF2-40B4-BE49-F238E27FC236}">
+                <a16:creationId xmlns:a16="http://schemas.microsoft.com/office/drawing/2014/main" id="{D4771268-CB57-404A-9271-370EB28F6090}"/>
+              </a:ext>
+              <a:ext uri="{C183D7F6-B498-43B3-948B-1728B52AA6E4}">
+                <adec:decorative xmlns:adec="http://schemas.microsoft.com/office/drawing/2017/decorative" val="1"/>
+              </a:ext>
+            </a:extLst>
+          </p:cNvPr>
+          <p:cNvSpPr>
+            <a:spLocks noGrp="1" noRot="1" noChangeAspect="1" noMove="1" noResize="1" noEditPoints="1" noAdjustHandles="1" noChangeArrowheads="1" noChangeShapeType="1" noTextEdit="1"/>
+          </p:cNvSpPr>
+          <p:nvPr>
+            <p:extLst>
+              <p:ext uri="{386F3935-93C4-4BCD-93E2-E3B085C9AB24}">
+                <p16:designElem xmlns:p16="http://schemas.microsoft.com/office/powerpoint/2015/main" val="1"/>
+              </p:ext>
+            </p:extLst>
+          </p:nvPr>
+        </p:nvSpPr>
+        <p:spPr>
+          <a:xfrm rot="16200000">
+            <a:off x="800421" y="1491115"/>
+            <a:ext cx="3333749" cy="3499559"/>
+          </a:xfrm>
+          <a:prstGeom prst="downArrow">
+            <a:avLst>
+              <a:gd name="adj1" fmla="val 100000"/>
+              <a:gd name="adj2" fmla="val 15788"/>
+            </a:avLst>
+          </a:prstGeom>
+          <a:solidFill>
+            <a:srgbClr val="404040"/>
+          </a:solidFill>
+          <a:ln w="53975">
+            <a:noFill/>
+          </a:ln>
+        </p:spPr>
+        <p:style>
+          <a:lnRef idx="2">
+            <a:schemeClr val="accent1">
+              <a:shade val="50000"/>
+            </a:schemeClr>
+          </a:lnRef>
+          <a:fillRef idx="1">
+            <a:schemeClr val="accent1"/>
+          </a:fillRef>
+          <a:effectRef idx="0">
+            <a:schemeClr val="accent1"/>
+          </a:effectRef>
+          <a:fontRef idx="minor">
+            <a:schemeClr val="lt1"/>
+          </a:fontRef>
+        </p:style>
+        <p:txBody>
+          <a:bodyPr rtlCol="0" anchor="ctr"/>
+          <a:lstStyle/>
+          <a:p>
+            <a:pPr algn="ctr"/>
+            <a:endParaRPr lang="en-US"/>
+          </a:p>
+        </p:txBody>
+      </p:sp>
+      <p:sp>
+        <p:nvSpPr>
+          <p:cNvPr id="3" name="Text Box 1">
+            <a:extLst>
+              <a:ext uri="{FF2B5EF4-FFF2-40B4-BE49-F238E27FC236}">
+                <a16:creationId xmlns:a16="http://schemas.microsoft.com/office/drawing/2014/main" id="{5CFF4141-8BED-A447-7CE3-DA548B1EA521}"/>
+              </a:ext>
+            </a:extLst>
+          </p:cNvPr>
+          <p:cNvSpPr txBox="1">
+            <a:spLocks noChangeArrowheads="1"/>
+          </p:cNvSpPr>
+          <p:nvPr/>
+        </p:nvSpPr>
+        <p:spPr bwMode="auto">
+          <a:xfrm>
+            <a:off x="1028833" y="1967266"/>
+            <a:ext cx="2629243" cy="2547257"/>
+          </a:xfrm>
+          <a:prstGeom prst="rect">
+            <a:avLst/>
+          </a:prstGeom>
+          <a:noFill/>
+          <a:extLst>
+            <a:ext uri="{909E8E84-426E-40DD-AFC4-6F175D3DCCD1}">
+              <a14:hiddenFill xmlns:a14="http://schemas.microsoft.com/office/drawing/2010/main">
+                <a:solidFill>
+                  <a:srgbClr val="FFFFFF"/>
+                </a:solidFill>
+              </a14:hiddenFill>
+            </a:ext>
+            <a:ext uri="{91240B29-F687-4F45-9708-019B960494DF}">
+              <a14:hiddenLine xmlns:a14="http://schemas.microsoft.com/office/drawing/2010/main" w="9525" cap="flat">
+                <a:solidFill>
+                  <a:srgbClr val="3465A4"/>
+                </a:solidFill>
+                <a:round/>
+                <a:headEnd/>
+                <a:tailEnd/>
+              </a14:hiddenLine>
+            </a:ext>
+            <a:ext uri="{AF507438-7753-43E0-B8FC-AC1667EBCBE1}">
+              <a14:hiddenEffects xmlns:a14="http://schemas.microsoft.com/office/drawing/2010/main">
+                <a:effectLst>
+                  <a:outerShdw dist="35921" dir="2700000" algn="ctr" rotWithShape="0">
+                    <a:srgbClr val="808080"/>
+                  </a:outerShdw>
+                </a:effectLst>
+              </a14:hiddenEffects>
+            </a:ext>
+          </a:extLst>
+        </p:spPr>
+        <p:txBody>
+          <a:bodyPr vert="horz" lIns="91440" tIns="45720" rIns="91440" bIns="45720" rtlCol="0" anchor="ctr">
+            <a:normAutofit/>
+          </a:bodyPr>
+          <a:lstStyle>
+            <a:lvl1pPr>
+              <a:tabLst>
+                <a:tab pos="0" algn="l"/>
+                <a:tab pos="914400" algn="l"/>
+                <a:tab pos="1828800" algn="l"/>
+                <a:tab pos="2743200" algn="l"/>
+                <a:tab pos="3657600" algn="l"/>
+                <a:tab pos="4572000" algn="l"/>
+                <a:tab pos="5486400" algn="l"/>
+                <a:tab pos="6400800" algn="l"/>
+                <a:tab pos="7315200" algn="l"/>
+                <a:tab pos="8229600" algn="l"/>
+                <a:tab pos="9144000" algn="l"/>
+                <a:tab pos="10058400" algn="l"/>
+                <a:tab pos="10515600" algn="l"/>
+              </a:tabLst>
+              <a:defRPr>
+                <a:solidFill>
+                  <a:srgbClr val="000000"/>
+                </a:solidFill>
+                <a:latin typeface="Calibri" panose="020F0502020204030204" pitchFamily="34" charset="0"/>
+                <a:ea typeface="Microsoft YaHei" panose="020B0503020204020204" pitchFamily="34" charset="-122"/>
+              </a:defRPr>
+            </a:lvl1pPr>
+            <a:lvl2pPr>
+              <a:tabLst>
+                <a:tab pos="0" algn="l"/>
+                <a:tab pos="914400" algn="l"/>
+                <a:tab pos="1828800" algn="l"/>
+                <a:tab pos="2743200" algn="l"/>
+                <a:tab pos="3657600" algn="l"/>
+                <a:tab pos="4572000" algn="l"/>
+                <a:tab pos="5486400" algn="l"/>
+                <a:tab pos="6400800" algn="l"/>
+                <a:tab pos="7315200" algn="l"/>
+                <a:tab pos="8229600" algn="l"/>
+                <a:tab pos="9144000" algn="l"/>
+                <a:tab pos="10058400" algn="l"/>
+                <a:tab pos="10515600" algn="l"/>
+              </a:tabLst>
+              <a:defRPr>
+                <a:solidFill>
+                  <a:srgbClr val="000000"/>
+                </a:solidFill>
+                <a:latin typeface="Calibri" panose="020F0502020204030204" pitchFamily="34" charset="0"/>
+                <a:ea typeface="Microsoft YaHei" panose="020B0503020204020204" pitchFamily="34" charset="-122"/>
+              </a:defRPr>
+            </a:lvl2pPr>
+            <a:lvl3pPr>
+              <a:tabLst>
+                <a:tab pos="0" algn="l"/>
+                <a:tab pos="914400" algn="l"/>
+                <a:tab pos="1828800" algn="l"/>
+                <a:tab pos="2743200" algn="l"/>
+                <a:tab pos="3657600" algn="l"/>
+                <a:tab pos="4572000" algn="l"/>
+                <a:tab pos="5486400" algn="l"/>
+                <a:tab pos="6400800" algn="l"/>
+                <a:tab pos="7315200" algn="l"/>
+                <a:tab pos="8229600" algn="l"/>
+                <a:tab pos="9144000" algn="l"/>
+                <a:tab pos="10058400" algn="l"/>
+                <a:tab pos="10515600" algn="l"/>
+              </a:tabLst>
+              <a:defRPr>
+                <a:solidFill>
+                  <a:srgbClr val="000000"/>
+                </a:solidFill>
+                <a:latin typeface="Calibri" panose="020F0502020204030204" pitchFamily="34" charset="0"/>
+                <a:ea typeface="Microsoft YaHei" panose="020B0503020204020204" pitchFamily="34" charset="-122"/>
+              </a:defRPr>
+            </a:lvl3pPr>
+            <a:lvl4pPr>
+              <a:tabLst>
+                <a:tab pos="0" algn="l"/>
+                <a:tab pos="914400" algn="l"/>
+                <a:tab pos="1828800" algn="l"/>
+                <a:tab pos="2743200" algn="l"/>
+                <a:tab pos="3657600" algn="l"/>
+                <a:tab pos="4572000" algn="l"/>
+                <a:tab pos="5486400" algn="l"/>
+                <a:tab pos="6400800" algn="l"/>
+                <a:tab pos="7315200" algn="l"/>
+                <a:tab pos="8229600" algn="l"/>
+                <a:tab pos="9144000" algn="l"/>
+                <a:tab pos="10058400" algn="l"/>
+                <a:tab pos="10515600" algn="l"/>
+              </a:tabLst>
+              <a:defRPr>
+                <a:solidFill>
+                  <a:srgbClr val="000000"/>
+                </a:solidFill>
+                <a:latin typeface="Calibri" panose="020F0502020204030204" pitchFamily="34" charset="0"/>
+                <a:ea typeface="Microsoft YaHei" panose="020B0503020204020204" pitchFamily="34" charset="-122"/>
+              </a:defRPr>
+            </a:lvl4pPr>
+            <a:lvl5pPr>
+              <a:tabLst>
+                <a:tab pos="0" algn="l"/>
+                <a:tab pos="914400" algn="l"/>
+                <a:tab pos="1828800" algn="l"/>
+                <a:tab pos="2743200" algn="l"/>
+                <a:tab pos="3657600" algn="l"/>
+                <a:tab pos="4572000" algn="l"/>
+                <a:tab pos="5486400" algn="l"/>
+                <a:tab pos="6400800" algn="l"/>
+                <a:tab pos="7315200" algn="l"/>
+                <a:tab pos="8229600" algn="l"/>
+                <a:tab pos="9144000" algn="l"/>
+                <a:tab pos="10058400" algn="l"/>
+                <a:tab pos="10515600" algn="l"/>
+              </a:tabLst>
+              <a:defRPr>
+                <a:solidFill>
+                  <a:srgbClr val="000000"/>
+                </a:solidFill>
+                <a:latin typeface="Calibri" panose="020F0502020204030204" pitchFamily="34" charset="0"/>
+                <a:ea typeface="Microsoft YaHei" panose="020B0503020204020204" pitchFamily="34" charset="-122"/>
+              </a:defRPr>
+            </a:lvl5pPr>
+            <a:lvl6pPr marL="2514600" indent="-228600" defTabSz="457200" eaLnBrk="0" fontAlgn="base" hangingPunct="0">
+              <a:spcBef>
+                <a:spcPts val="13"/>
+              </a:spcBef>
+              <a:spcAft>
+                <a:spcPts val="13"/>
+              </a:spcAft>
+              <a:buClr>
+                <a:srgbClr val="000000"/>
+              </a:buClr>
+              <a:buSzPct val="100000"/>
+              <a:buFont typeface="Times New Roman" panose="02020603050405020304" pitchFamily="18" charset="0"/>
+              <a:tabLst>
+                <a:tab pos="0" algn="l"/>
+                <a:tab pos="914400" algn="l"/>
+                <a:tab pos="1828800" algn="l"/>
+                <a:tab pos="2743200" algn="l"/>
+                <a:tab pos="3657600" algn="l"/>
+                <a:tab pos="4572000" algn="l"/>
+                <a:tab pos="5486400" algn="l"/>
+                <a:tab pos="6400800" algn="l"/>
+                <a:tab pos="7315200" algn="l"/>
+                <a:tab pos="8229600" algn="l"/>
+                <a:tab pos="9144000" algn="l"/>
+                <a:tab pos="10058400" algn="l"/>
+                <a:tab pos="10515600" algn="l"/>
+              </a:tabLst>
+              <a:defRPr>
+                <a:solidFill>
+                  <a:srgbClr val="000000"/>
+                </a:solidFill>
+                <a:latin typeface="Calibri" panose="020F0502020204030204" pitchFamily="34" charset="0"/>
+                <a:ea typeface="Microsoft YaHei" panose="020B0503020204020204" pitchFamily="34" charset="-122"/>
+              </a:defRPr>
+            </a:lvl6pPr>
+            <a:lvl7pPr marL="2971800" indent="-228600" defTabSz="457200" eaLnBrk="0" fontAlgn="base" hangingPunct="0">
+              <a:spcBef>
+                <a:spcPts val="13"/>
+              </a:spcBef>
+              <a:spcAft>
+                <a:spcPts val="13"/>
+              </a:spcAft>
+              <a:buClr>
+                <a:srgbClr val="000000"/>
+              </a:buClr>
+              <a:buSzPct val="100000"/>
+              <a:buFont typeface="Times New Roman" panose="02020603050405020304" pitchFamily="18" charset="0"/>
+              <a:tabLst>
+                <a:tab pos="0" algn="l"/>
+                <a:tab pos="914400" algn="l"/>
+                <a:tab pos="1828800" algn="l"/>
+                <a:tab pos="2743200" algn="l"/>
+                <a:tab pos="3657600" algn="l"/>
+                <a:tab pos="4572000" algn="l"/>
+                <a:tab pos="5486400" algn="l"/>
+                <a:tab pos="6400800" algn="l"/>
+                <a:tab pos="7315200" algn="l"/>
+                <a:tab pos="8229600" algn="l"/>
+                <a:tab pos="9144000" algn="l"/>
+                <a:tab pos="10058400" algn="l"/>
+                <a:tab pos="10515600" algn="l"/>
+              </a:tabLst>
+              <a:defRPr>
+                <a:solidFill>
+                  <a:srgbClr val="000000"/>
+                </a:solidFill>
+                <a:latin typeface="Calibri" panose="020F0502020204030204" pitchFamily="34" charset="0"/>
+                <a:ea typeface="Microsoft YaHei" panose="020B0503020204020204" pitchFamily="34" charset="-122"/>
+              </a:defRPr>
+            </a:lvl7pPr>
+            <a:lvl8pPr marL="3429000" indent="-228600" defTabSz="457200" eaLnBrk="0" fontAlgn="base" hangingPunct="0">
+              <a:spcBef>
+                <a:spcPts val="13"/>
+              </a:spcBef>
+              <a:spcAft>
+                <a:spcPts val="13"/>
+              </a:spcAft>
+              <a:buClr>
+                <a:srgbClr val="000000"/>
+              </a:buClr>
+              <a:buSzPct val="100000"/>
+              <a:buFont typeface="Times New Roman" panose="02020603050405020304" pitchFamily="18" charset="0"/>
+              <a:tabLst>
+                <a:tab pos="0" algn="l"/>
+                <a:tab pos="914400" algn="l"/>
+                <a:tab pos="1828800" algn="l"/>
+                <a:tab pos="2743200" algn="l"/>
+                <a:tab pos="3657600" algn="l"/>
+                <a:tab pos="4572000" algn="l"/>
+                <a:tab pos="5486400" algn="l"/>
+                <a:tab pos="6400800" algn="l"/>
+                <a:tab pos="7315200" algn="l"/>
+                <a:tab pos="8229600" algn="l"/>
+                <a:tab pos="9144000" algn="l"/>
+                <a:tab pos="10058400" algn="l"/>
+                <a:tab pos="10515600" algn="l"/>
+              </a:tabLst>
+              <a:defRPr>
+                <a:solidFill>
+                  <a:srgbClr val="000000"/>
+                </a:solidFill>
+                <a:latin typeface="Calibri" panose="020F0502020204030204" pitchFamily="34" charset="0"/>
+                <a:ea typeface="Microsoft YaHei" panose="020B0503020204020204" pitchFamily="34" charset="-122"/>
+              </a:defRPr>
+            </a:lvl8pPr>
+            <a:lvl9pPr marL="3886200" indent="-228600" defTabSz="457200" eaLnBrk="0" fontAlgn="base" hangingPunct="0">
+              <a:spcBef>
+                <a:spcPts val="13"/>
+              </a:spcBef>
+              <a:spcAft>
+                <a:spcPts val="13"/>
+              </a:spcAft>
+              <a:buClr>
+                <a:srgbClr val="000000"/>
+              </a:buClr>
+              <a:buSzPct val="100000"/>
+              <a:buFont typeface="Times New Roman" panose="02020603050405020304" pitchFamily="18" charset="0"/>
+              <a:tabLst>
+                <a:tab pos="0" algn="l"/>
+                <a:tab pos="914400" algn="l"/>
+                <a:tab pos="1828800" algn="l"/>
+                <a:tab pos="2743200" algn="l"/>
+                <a:tab pos="3657600" algn="l"/>
+                <a:tab pos="4572000" algn="l"/>
+                <a:tab pos="5486400" algn="l"/>
+                <a:tab pos="6400800" algn="l"/>
+                <a:tab pos="7315200" algn="l"/>
+                <a:tab pos="8229600" algn="l"/>
+                <a:tab pos="9144000" algn="l"/>
+                <a:tab pos="10058400" algn="l"/>
+                <a:tab pos="10515600" algn="l"/>
+              </a:tabLst>
+              <a:defRPr>
+                <a:solidFill>
+                  <a:srgbClr val="000000"/>
+                </a:solidFill>
+                <a:latin typeface="Calibri" panose="020F0502020204030204" pitchFamily="34" charset="0"/>
+                <a:ea typeface="Microsoft YaHei" panose="020B0503020204020204" pitchFamily="34" charset="-122"/>
+              </a:defRPr>
+            </a:lvl9pPr>
+          </a:lstStyle>
+          <a:p>
+            <a:pPr algn="ctr" defTabSz="914400" eaLnBrk="1" hangingPunct="1">
+              <a:lnSpc>
+                <a:spcPct val="90000"/>
+              </a:lnSpc>
+              <a:spcBef>
+                <a:spcPct val="0"/>
+              </a:spcBef>
+            </a:pPr>
+            <a:r>
+              <a:rPr lang="en-US" sz="3600" kern="1200">
+                <a:solidFill>
+                  <a:srgbClr val="FFFFFF"/>
+                </a:solidFill>
+                <a:latin typeface="+mj-lt"/>
+                <a:ea typeface="+mj-ea"/>
+                <a:cs typeface="+mj-cs"/>
+              </a:rPr>
+              <a:t>Analyzing State to Loan Status</a:t>
+            </a:r>
+          </a:p>
+        </p:txBody>
+      </p:sp>
+      <p:pic>
+        <p:nvPicPr>
+          <p:cNvPr id="4" name="Picture 4" descr="Chart, bar chart, histogram&#10;&#10;Description automatically generated">
+            <a:extLst>
+              <a:ext uri="{FF2B5EF4-FFF2-40B4-BE49-F238E27FC236}">
+                <a16:creationId xmlns:a16="http://schemas.microsoft.com/office/drawing/2014/main" id="{02405E82-16C1-EBA2-409E-51730BFA8081}"/>
+              </a:ext>
+            </a:extLst>
+          </p:cNvPr>
+          <p:cNvPicPr>
+            <a:picLocks noChangeAspect="1"/>
+          </p:cNvPicPr>
+          <p:nvPr/>
+        </p:nvPicPr>
+        <p:blipFill>
+          <a:blip r:embed="rId2"/>
+          <a:stretch>
+            <a:fillRect/>
+          </a:stretch>
+        </p:blipFill>
+        <p:spPr>
+          <a:xfrm>
+            <a:off x="4777938" y="1582538"/>
+            <a:ext cx="6781582" cy="3390791"/>
+          </a:xfrm>
+          <a:prstGeom prst="rect">
+            <a:avLst/>
+          </a:prstGeom>
+        </p:spPr>
+      </p:pic>
+      <p:sp>
+        <p:nvSpPr>
+          <p:cNvPr id="6" name="TextBox 5">
+            <a:extLst>
+              <a:ext uri="{FF2B5EF4-FFF2-40B4-BE49-F238E27FC236}">
+                <a16:creationId xmlns:a16="http://schemas.microsoft.com/office/drawing/2014/main" id="{2E6B984B-D5EB-53BC-1099-260EDB9CFB1B}"/>
+              </a:ext>
+            </a:extLst>
+          </p:cNvPr>
+          <p:cNvSpPr txBox="1"/>
+          <p:nvPr/>
+        </p:nvSpPr>
+        <p:spPr>
+          <a:xfrm>
+            <a:off x="715436" y="5817218"/>
+            <a:ext cx="11356238" cy="738664"/>
+          </a:xfrm>
+          <a:prstGeom prst="rect">
+            <a:avLst/>
+          </a:prstGeom>
+          <a:noFill/>
+        </p:spPr>
+        <p:txBody>
+          <a:bodyPr rot="0" spcFirstLastPara="0" vertOverflow="overflow" horzOverflow="overflow" vert="horz" wrap="square" lIns="91440" tIns="45720" rIns="91440" bIns="45720" numCol="1" spcCol="0" rtlCol="0" fromWordArt="0" anchor="t" anchorCtr="0" forceAA="0" compatLnSpc="1">
+            <a:prstTxWarp prst="textNoShape">
+              <a:avLst/>
+            </a:prstTxWarp>
+            <a:spAutoFit/>
+          </a:bodyPr>
+          <a:lstStyle/>
+          <a:p>
+            <a:r>
+              <a:rPr lang="en-US" sz="1400" dirty="0">
+                <a:solidFill>
+                  <a:schemeClr val="tx1"/>
+                </a:solidFill>
+                <a:latin typeface="Calibri"/>
+                <a:ea typeface="Microsoft YaHei"/>
+                <a:cs typeface="Calibri"/>
+              </a:rPr>
+              <a:t>According to the </a:t>
+            </a:r>
+            <a:r>
+              <a:rPr lang="en-US" sz="1400" b="1" dirty="0">
+                <a:solidFill>
+                  <a:schemeClr val="tx1"/>
+                </a:solidFill>
+                <a:latin typeface="Calibri"/>
+                <a:ea typeface="Microsoft YaHei"/>
+                <a:cs typeface="Calibri"/>
+              </a:rPr>
+              <a:t>State to Loan Status</a:t>
+            </a:r>
+            <a:r>
+              <a:rPr lang="en-US" sz="1400" dirty="0">
+                <a:solidFill>
+                  <a:schemeClr val="tx1"/>
+                </a:solidFill>
+                <a:latin typeface="Calibri"/>
+                <a:ea typeface="Microsoft YaHei"/>
+                <a:cs typeface="Calibri"/>
+              </a:rPr>
+              <a:t>, we can conclude the following,</a:t>
+            </a:r>
+            <a:br>
+              <a:rPr lang="en-US" sz="1400" dirty="0">
+                <a:solidFill>
+                  <a:schemeClr val="tx1"/>
+                </a:solidFill>
+                <a:cs typeface="Calibri"/>
+              </a:rPr>
+            </a:br>
+            <a:r>
+              <a:rPr lang="en-US" sz="1400" dirty="0">
+                <a:solidFill>
+                  <a:schemeClr val="tx1"/>
+                </a:solidFill>
+                <a:latin typeface="Calibri"/>
+                <a:ea typeface="Microsoft YaHei"/>
+                <a:cs typeface="Calibri"/>
+              </a:rPr>
+              <a:t>     - State </a:t>
+            </a:r>
+            <a:r>
+              <a:rPr lang="en-US" sz="1400" b="1" dirty="0">
+                <a:solidFill>
+                  <a:schemeClr val="tx1"/>
+                </a:solidFill>
+                <a:latin typeface="Calibri"/>
+                <a:ea typeface="Microsoft YaHei"/>
+                <a:cs typeface="Calibri"/>
+              </a:rPr>
+              <a:t>TN</a:t>
+            </a:r>
+            <a:r>
+              <a:rPr lang="en-US" sz="1400" dirty="0">
+                <a:solidFill>
+                  <a:schemeClr val="tx1"/>
+                </a:solidFill>
+                <a:latin typeface="Calibri"/>
+                <a:ea typeface="Microsoft YaHei"/>
+                <a:cs typeface="Calibri"/>
+              </a:rPr>
+              <a:t> is the highest </a:t>
+            </a:r>
+            <a:r>
+              <a:rPr lang="en-US" sz="1400" b="1" dirty="0">
+                <a:solidFill>
+                  <a:schemeClr val="tx1"/>
+                </a:solidFill>
+                <a:latin typeface="Calibri"/>
+                <a:ea typeface="Microsoft YaHei"/>
+                <a:cs typeface="Calibri"/>
+              </a:rPr>
+              <a:t>Charged Off</a:t>
+            </a:r>
+            <a:r>
+              <a:rPr lang="en-US" sz="1400" dirty="0">
+                <a:solidFill>
+                  <a:schemeClr val="tx1"/>
+                </a:solidFill>
+                <a:latin typeface="Calibri"/>
+                <a:ea typeface="Microsoft YaHei"/>
+                <a:cs typeface="Calibri"/>
+              </a:rPr>
+              <a:t> state</a:t>
+            </a:r>
+            <a:endParaRPr lang="en-US" dirty="0">
+              <a:solidFill>
+                <a:schemeClr val="tx1"/>
+              </a:solidFill>
+              <a:cs typeface="Calibri"/>
+            </a:endParaRPr>
+          </a:p>
+          <a:p>
+            <a:endParaRPr lang="en-US" sz="1400" dirty="0">
+              <a:solidFill>
+                <a:schemeClr val="tx1"/>
+              </a:solidFill>
+              <a:cs typeface="Calibri"/>
+            </a:endParaRPr>
+          </a:p>
+        </p:txBody>
+      </p:sp>
+    </p:spTree>
+    <p:extLst>
+      <p:ext uri="{BB962C8B-B14F-4D97-AF65-F5344CB8AC3E}">
+        <p14:creationId xmlns:p14="http://schemas.microsoft.com/office/powerpoint/2010/main" val="393885592"/>
+      </p:ext>
+    </p:extLst>
+  </p:cSld>
+  <p:clrMapOvr>
+    <a:masterClrMapping/>
+  </p:clrMapOvr>
+</p:sld>
+</file>
+
+<file path=ppt/slides/slide31.xml><?xml version="1.0" encoding="utf-8"?>
 <p:sld xmlns:a="http://schemas.openxmlformats.org/drawingml/2006/main" xmlns:r="http://schemas.openxmlformats.org/officeDocument/2006/relationships" xmlns:p="http://schemas.openxmlformats.org/presentationml/2006/main">
   <p:cSld>
     <p:bg>
@@ -21413,7 +22032,7 @@
 </p:sld>
 </file>
 
-<file path=ppt/slides/slide31.xml><?xml version="1.0" encoding="utf-8"?>
+<file path=ppt/slides/slide32.xml><?xml version="1.0" encoding="utf-8"?>
 <p:sld xmlns:a="http://schemas.openxmlformats.org/drawingml/2006/main" xmlns:r="http://schemas.openxmlformats.org/officeDocument/2006/relationships" xmlns:p="http://schemas.openxmlformats.org/presentationml/2006/main">
   <p:cSld>
     <p:bg>
@@ -21888,7 +22507,7 @@
 </p:sld>
 </file>
 
-<file path=ppt/slides/slide32.xml><?xml version="1.0" encoding="utf-8"?>
+<file path=ppt/slides/slide33.xml><?xml version="1.0" encoding="utf-8"?>
 <p:sld xmlns:a="http://schemas.openxmlformats.org/drawingml/2006/main" xmlns:r="http://schemas.openxmlformats.org/officeDocument/2006/relationships" xmlns:p="http://schemas.openxmlformats.org/presentationml/2006/main">
   <p:cSld>
     <p:spTree>
@@ -22232,16 +22851,433 @@
               </a:lnSpc>
             </a:pPr>
             <a:r>
-              <a:rPr lang="en-US" sz="4400" u="sng">
+              <a:rPr lang="en-US" sz="4400" u="sng" dirty="0">
                 <a:latin typeface="Calibri"/>
                 <a:ea typeface="Microsoft YaHei"/>
                 <a:cs typeface="Calibri"/>
               </a:rPr>
-              <a:t>Recommendation/Observations </a:t>
-            </a:r>
-            <a:endParaRPr lang="en-US" u="sng">
+              <a:t>Recommendation</a:t>
+            </a:r>
+            <a:endParaRPr lang="en-US" u="sng" dirty="0">
               <a:cs typeface="Calibri"/>
             </a:endParaRPr>
+          </a:p>
+        </p:txBody>
+      </p:sp>
+      <p:sp>
+        <p:nvSpPr>
+          <p:cNvPr id="4" name="Text Box 2">
+            <a:extLst>
+              <a:ext uri="{FF2B5EF4-FFF2-40B4-BE49-F238E27FC236}">
+                <a16:creationId xmlns:a16="http://schemas.microsoft.com/office/drawing/2014/main" id="{EBE0255E-E601-8D89-E928-A3E9AA9C3429}"/>
+              </a:ext>
+            </a:extLst>
+          </p:cNvPr>
+          <p:cNvSpPr txBox="1">
+            <a:spLocks noChangeArrowheads="1"/>
+          </p:cNvSpPr>
+          <p:nvPr/>
+        </p:nvSpPr>
+        <p:spPr bwMode="auto">
+          <a:xfrm>
+            <a:off x="838200" y="1711763"/>
+            <a:ext cx="10515600" cy="4351338"/>
+          </a:xfrm>
+          <a:prstGeom prst="rect">
+            <a:avLst/>
+          </a:prstGeom>
+          <a:noFill/>
+          <a:ln>
+            <a:noFill/>
+          </a:ln>
+          <a:effectLst/>
+          <a:extLst>
+            <a:ext uri="{909E8E84-426E-40DD-AFC4-6F175D3DCCD1}">
+              <a14:hiddenFill xmlns:a14="http://schemas.microsoft.com/office/drawing/2010/main">
+                <a:solidFill>
+                  <a:srgbClr val="FFFFFF"/>
+                </a:solidFill>
+              </a14:hiddenFill>
+            </a:ext>
+            <a:ext uri="{91240B29-F687-4F45-9708-019B960494DF}">
+              <a14:hiddenLine xmlns:a14="http://schemas.microsoft.com/office/drawing/2010/main" w="9525" cap="flat">
+                <a:solidFill>
+                  <a:srgbClr val="3465A4"/>
+                </a:solidFill>
+                <a:round/>
+                <a:headEnd/>
+                <a:tailEnd/>
+              </a14:hiddenLine>
+            </a:ext>
+            <a:ext uri="{AF507438-7753-43E0-B8FC-AC1667EBCBE1}">
+              <a14:hiddenEffects xmlns:a14="http://schemas.microsoft.com/office/drawing/2010/main">
+                <a:effectLst>
+                  <a:outerShdw dist="35921" dir="2700000" algn="ctr" rotWithShape="0">
+                    <a:srgbClr val="808080"/>
+                  </a:outerShdw>
+                </a:effectLst>
+              </a14:hiddenEffects>
+            </a:ext>
+          </a:extLst>
+        </p:spPr>
+        <p:txBody>
+          <a:bodyPr lIns="91440" tIns="45720" rIns="91440" bIns="45720" anchor="t"/>
+          <a:lstStyle>
+            <a:lvl1pPr marL="228600" indent="-228600">
+              <a:tabLst>
+                <a:tab pos="914400" algn="l"/>
+                <a:tab pos="1828800" algn="l"/>
+                <a:tab pos="2743200" algn="l"/>
+                <a:tab pos="3657600" algn="l"/>
+                <a:tab pos="4572000" algn="l"/>
+                <a:tab pos="5486400" algn="l"/>
+                <a:tab pos="6400800" algn="l"/>
+                <a:tab pos="7315200" algn="l"/>
+                <a:tab pos="8229600" algn="l"/>
+                <a:tab pos="9144000" algn="l"/>
+                <a:tab pos="10058400" algn="l"/>
+                <a:tab pos="10515600" algn="l"/>
+              </a:tabLst>
+              <a:defRPr>
+                <a:solidFill>
+                  <a:srgbClr val="000000"/>
+                </a:solidFill>
+                <a:latin typeface="Calibri" panose="020F0502020204030204" pitchFamily="34" charset="0"/>
+                <a:ea typeface="Microsoft YaHei" panose="020B0503020204020204" pitchFamily="34" charset="-122"/>
+              </a:defRPr>
+            </a:lvl1pPr>
+            <a:lvl2pPr>
+              <a:tabLst>
+                <a:tab pos="914400" algn="l"/>
+                <a:tab pos="1828800" algn="l"/>
+                <a:tab pos="2743200" algn="l"/>
+                <a:tab pos="3657600" algn="l"/>
+                <a:tab pos="4572000" algn="l"/>
+                <a:tab pos="5486400" algn="l"/>
+                <a:tab pos="6400800" algn="l"/>
+                <a:tab pos="7315200" algn="l"/>
+                <a:tab pos="8229600" algn="l"/>
+                <a:tab pos="9144000" algn="l"/>
+                <a:tab pos="10058400" algn="l"/>
+                <a:tab pos="10515600" algn="l"/>
+              </a:tabLst>
+              <a:defRPr>
+                <a:solidFill>
+                  <a:srgbClr val="000000"/>
+                </a:solidFill>
+                <a:latin typeface="Calibri" panose="020F0502020204030204" pitchFamily="34" charset="0"/>
+                <a:ea typeface="Microsoft YaHei" panose="020B0503020204020204" pitchFamily="34" charset="-122"/>
+              </a:defRPr>
+            </a:lvl2pPr>
+            <a:lvl3pPr>
+              <a:tabLst>
+                <a:tab pos="914400" algn="l"/>
+                <a:tab pos="1828800" algn="l"/>
+                <a:tab pos="2743200" algn="l"/>
+                <a:tab pos="3657600" algn="l"/>
+                <a:tab pos="4572000" algn="l"/>
+                <a:tab pos="5486400" algn="l"/>
+                <a:tab pos="6400800" algn="l"/>
+                <a:tab pos="7315200" algn="l"/>
+                <a:tab pos="8229600" algn="l"/>
+                <a:tab pos="9144000" algn="l"/>
+                <a:tab pos="10058400" algn="l"/>
+                <a:tab pos="10515600" algn="l"/>
+              </a:tabLst>
+              <a:defRPr>
+                <a:solidFill>
+                  <a:srgbClr val="000000"/>
+                </a:solidFill>
+                <a:latin typeface="Calibri" panose="020F0502020204030204" pitchFamily="34" charset="0"/>
+                <a:ea typeface="Microsoft YaHei" panose="020B0503020204020204" pitchFamily="34" charset="-122"/>
+              </a:defRPr>
+            </a:lvl3pPr>
+            <a:lvl4pPr>
+              <a:tabLst>
+                <a:tab pos="914400" algn="l"/>
+                <a:tab pos="1828800" algn="l"/>
+                <a:tab pos="2743200" algn="l"/>
+                <a:tab pos="3657600" algn="l"/>
+                <a:tab pos="4572000" algn="l"/>
+                <a:tab pos="5486400" algn="l"/>
+                <a:tab pos="6400800" algn="l"/>
+                <a:tab pos="7315200" algn="l"/>
+                <a:tab pos="8229600" algn="l"/>
+                <a:tab pos="9144000" algn="l"/>
+                <a:tab pos="10058400" algn="l"/>
+                <a:tab pos="10515600" algn="l"/>
+              </a:tabLst>
+              <a:defRPr>
+                <a:solidFill>
+                  <a:srgbClr val="000000"/>
+                </a:solidFill>
+                <a:latin typeface="Calibri" panose="020F0502020204030204" pitchFamily="34" charset="0"/>
+                <a:ea typeface="Microsoft YaHei" panose="020B0503020204020204" pitchFamily="34" charset="-122"/>
+              </a:defRPr>
+            </a:lvl4pPr>
+            <a:lvl5pPr>
+              <a:tabLst>
+                <a:tab pos="914400" algn="l"/>
+                <a:tab pos="1828800" algn="l"/>
+                <a:tab pos="2743200" algn="l"/>
+                <a:tab pos="3657600" algn="l"/>
+                <a:tab pos="4572000" algn="l"/>
+                <a:tab pos="5486400" algn="l"/>
+                <a:tab pos="6400800" algn="l"/>
+                <a:tab pos="7315200" algn="l"/>
+                <a:tab pos="8229600" algn="l"/>
+                <a:tab pos="9144000" algn="l"/>
+                <a:tab pos="10058400" algn="l"/>
+                <a:tab pos="10515600" algn="l"/>
+              </a:tabLst>
+              <a:defRPr>
+                <a:solidFill>
+                  <a:srgbClr val="000000"/>
+                </a:solidFill>
+                <a:latin typeface="Calibri" panose="020F0502020204030204" pitchFamily="34" charset="0"/>
+                <a:ea typeface="Microsoft YaHei" panose="020B0503020204020204" pitchFamily="34" charset="-122"/>
+              </a:defRPr>
+            </a:lvl5pPr>
+            <a:lvl6pPr marL="2514600" indent="-228600" defTabSz="457200" eaLnBrk="0" fontAlgn="base" hangingPunct="0">
+              <a:spcBef>
+                <a:spcPts val="13"/>
+              </a:spcBef>
+              <a:spcAft>
+                <a:spcPts val="13"/>
+              </a:spcAft>
+              <a:buClr>
+                <a:srgbClr val="000000"/>
+              </a:buClr>
+              <a:buSzPct val="100000"/>
+              <a:buFont typeface="Times New Roman" panose="02020603050405020304" pitchFamily="18" charset="0"/>
+              <a:tabLst>
+                <a:tab pos="914400" algn="l"/>
+                <a:tab pos="1828800" algn="l"/>
+                <a:tab pos="2743200" algn="l"/>
+                <a:tab pos="3657600" algn="l"/>
+                <a:tab pos="4572000" algn="l"/>
+                <a:tab pos="5486400" algn="l"/>
+                <a:tab pos="6400800" algn="l"/>
+                <a:tab pos="7315200" algn="l"/>
+                <a:tab pos="8229600" algn="l"/>
+                <a:tab pos="9144000" algn="l"/>
+                <a:tab pos="10058400" algn="l"/>
+                <a:tab pos="10515600" algn="l"/>
+              </a:tabLst>
+              <a:defRPr>
+                <a:solidFill>
+                  <a:srgbClr val="000000"/>
+                </a:solidFill>
+                <a:latin typeface="Calibri" panose="020F0502020204030204" pitchFamily="34" charset="0"/>
+                <a:ea typeface="Microsoft YaHei" panose="020B0503020204020204" pitchFamily="34" charset="-122"/>
+              </a:defRPr>
+            </a:lvl6pPr>
+            <a:lvl7pPr marL="2971800" indent="-228600" defTabSz="457200" eaLnBrk="0" fontAlgn="base" hangingPunct="0">
+              <a:spcBef>
+                <a:spcPts val="13"/>
+              </a:spcBef>
+              <a:spcAft>
+                <a:spcPts val="13"/>
+              </a:spcAft>
+              <a:buClr>
+                <a:srgbClr val="000000"/>
+              </a:buClr>
+              <a:buSzPct val="100000"/>
+              <a:buFont typeface="Times New Roman" panose="02020603050405020304" pitchFamily="18" charset="0"/>
+              <a:tabLst>
+                <a:tab pos="914400" algn="l"/>
+                <a:tab pos="1828800" algn="l"/>
+                <a:tab pos="2743200" algn="l"/>
+                <a:tab pos="3657600" algn="l"/>
+                <a:tab pos="4572000" algn="l"/>
+                <a:tab pos="5486400" algn="l"/>
+                <a:tab pos="6400800" algn="l"/>
+                <a:tab pos="7315200" algn="l"/>
+                <a:tab pos="8229600" algn="l"/>
+                <a:tab pos="9144000" algn="l"/>
+                <a:tab pos="10058400" algn="l"/>
+                <a:tab pos="10515600" algn="l"/>
+              </a:tabLst>
+              <a:defRPr>
+                <a:solidFill>
+                  <a:srgbClr val="000000"/>
+                </a:solidFill>
+                <a:latin typeface="Calibri" panose="020F0502020204030204" pitchFamily="34" charset="0"/>
+                <a:ea typeface="Microsoft YaHei" panose="020B0503020204020204" pitchFamily="34" charset="-122"/>
+              </a:defRPr>
+            </a:lvl7pPr>
+            <a:lvl8pPr marL="3429000" indent="-228600" defTabSz="457200" eaLnBrk="0" fontAlgn="base" hangingPunct="0">
+              <a:spcBef>
+                <a:spcPts val="13"/>
+              </a:spcBef>
+              <a:spcAft>
+                <a:spcPts val="13"/>
+              </a:spcAft>
+              <a:buClr>
+                <a:srgbClr val="000000"/>
+              </a:buClr>
+              <a:buSzPct val="100000"/>
+              <a:buFont typeface="Times New Roman" panose="02020603050405020304" pitchFamily="18" charset="0"/>
+              <a:tabLst>
+                <a:tab pos="914400" algn="l"/>
+                <a:tab pos="1828800" algn="l"/>
+                <a:tab pos="2743200" algn="l"/>
+                <a:tab pos="3657600" algn="l"/>
+                <a:tab pos="4572000" algn="l"/>
+                <a:tab pos="5486400" algn="l"/>
+                <a:tab pos="6400800" algn="l"/>
+                <a:tab pos="7315200" algn="l"/>
+                <a:tab pos="8229600" algn="l"/>
+                <a:tab pos="9144000" algn="l"/>
+                <a:tab pos="10058400" algn="l"/>
+                <a:tab pos="10515600" algn="l"/>
+              </a:tabLst>
+              <a:defRPr>
+                <a:solidFill>
+                  <a:srgbClr val="000000"/>
+                </a:solidFill>
+                <a:latin typeface="Calibri" panose="020F0502020204030204" pitchFamily="34" charset="0"/>
+                <a:ea typeface="Microsoft YaHei" panose="020B0503020204020204" pitchFamily="34" charset="-122"/>
+              </a:defRPr>
+            </a:lvl8pPr>
+            <a:lvl9pPr marL="3886200" indent="-228600" defTabSz="457200" eaLnBrk="0" fontAlgn="base" hangingPunct="0">
+              <a:spcBef>
+                <a:spcPts val="13"/>
+              </a:spcBef>
+              <a:spcAft>
+                <a:spcPts val="13"/>
+              </a:spcAft>
+              <a:buClr>
+                <a:srgbClr val="000000"/>
+              </a:buClr>
+              <a:buSzPct val="100000"/>
+              <a:buFont typeface="Times New Roman" panose="02020603050405020304" pitchFamily="18" charset="0"/>
+              <a:tabLst>
+                <a:tab pos="914400" algn="l"/>
+                <a:tab pos="1828800" algn="l"/>
+                <a:tab pos="2743200" algn="l"/>
+                <a:tab pos="3657600" algn="l"/>
+                <a:tab pos="4572000" algn="l"/>
+                <a:tab pos="5486400" algn="l"/>
+                <a:tab pos="6400800" algn="l"/>
+                <a:tab pos="7315200" algn="l"/>
+                <a:tab pos="8229600" algn="l"/>
+                <a:tab pos="9144000" algn="l"/>
+                <a:tab pos="10058400" algn="l"/>
+                <a:tab pos="10515600" algn="l"/>
+              </a:tabLst>
+              <a:defRPr>
+                <a:solidFill>
+                  <a:srgbClr val="000000"/>
+                </a:solidFill>
+                <a:latin typeface="Calibri" panose="020F0502020204030204" pitchFamily="34" charset="0"/>
+                <a:ea typeface="Microsoft YaHei" panose="020B0503020204020204" pitchFamily="34" charset="-122"/>
+              </a:defRPr>
+            </a:lvl9pPr>
+          </a:lstStyle>
+          <a:p>
+            <a:pPr marL="457200" indent="-457200">
+              <a:buFont typeface="Arial" panose="02020603050405020304" pitchFamily="18" charset="0"/>
+              <a:buChar char="•"/>
+            </a:pPr>
+            <a:r>
+              <a:rPr lang="en-US" sz="2800" dirty="0">
+                <a:latin typeface="Calibri"/>
+                <a:ea typeface="Microsoft YaHei"/>
+                <a:cs typeface="Calibri"/>
+              </a:rPr>
+              <a:t>Annual income less than 20K at higher risk of defaulting</a:t>
+            </a:r>
+            <a:endParaRPr lang="en-US" dirty="0">
+              <a:latin typeface="Calibri"/>
+              <a:ea typeface="Microsoft YaHei"/>
+              <a:cs typeface="Calibri"/>
+            </a:endParaRPr>
+          </a:p>
+          <a:p>
+            <a:pPr marL="457200" indent="-457200">
+              <a:buFont typeface="Arial" panose="02020603050405020304" pitchFamily="18" charset="0"/>
+              <a:buChar char="•"/>
+            </a:pPr>
+            <a:r>
+              <a:rPr lang="en-US" sz="2800" dirty="0">
+                <a:latin typeface="Calibri"/>
+                <a:ea typeface="Microsoft YaHei"/>
+                <a:cs typeface="Calibri"/>
+              </a:rPr>
+              <a:t>Loan amount higher than 25K at risk of defaulting</a:t>
+            </a:r>
+            <a:endParaRPr lang="en-US" dirty="0">
+              <a:latin typeface="Calibri"/>
+              <a:ea typeface="Microsoft YaHei"/>
+              <a:cs typeface="Calibri"/>
+            </a:endParaRPr>
+          </a:p>
+          <a:p>
+            <a:pPr marL="457200" indent="-457200">
+              <a:buFont typeface="Arial" panose="02020603050405020304" pitchFamily="18" charset="0"/>
+              <a:buChar char="•"/>
+            </a:pPr>
+            <a:r>
+              <a:rPr lang="en-US" sz="2800" dirty="0">
+                <a:latin typeface="Calibri"/>
+                <a:ea typeface="Microsoft YaHei"/>
+                <a:cs typeface="Calibri"/>
+              </a:rPr>
+              <a:t>Higher the interest rate, higher the risk of defaulting</a:t>
+            </a:r>
+            <a:endParaRPr lang="en-US" dirty="0">
+              <a:latin typeface="Calibri"/>
+              <a:ea typeface="Microsoft YaHei"/>
+              <a:cs typeface="Calibri"/>
+            </a:endParaRPr>
+          </a:p>
+          <a:p>
+            <a:pPr marL="457200" indent="-457200">
+              <a:buFont typeface="Arial" panose="02020603050405020304" pitchFamily="18" charset="0"/>
+              <a:buChar char="•"/>
+            </a:pPr>
+            <a:r>
+              <a:rPr lang="en-US" sz="2800" dirty="0">
+                <a:latin typeface="Calibri"/>
+                <a:ea typeface="Microsoft YaHei"/>
+                <a:cs typeface="Calibri"/>
+              </a:rPr>
+              <a:t>People who pick longer loan term is slightly higher risk than the lower term people</a:t>
+            </a:r>
+            <a:endParaRPr lang="en-US" dirty="0">
+              <a:latin typeface="Calibri"/>
+              <a:ea typeface="Microsoft YaHei"/>
+              <a:cs typeface="Calibri"/>
+            </a:endParaRPr>
+          </a:p>
+          <a:p>
+            <a:pPr marL="457200" indent="-457200">
+              <a:buFont typeface="Arial" panose="02020603050405020304" pitchFamily="18" charset="0"/>
+              <a:buChar char="•"/>
+            </a:pPr>
+            <a:r>
+              <a:rPr lang="en-US" sz="2800" dirty="0">
+                <a:latin typeface="Calibri"/>
+                <a:ea typeface="Microsoft YaHei"/>
+                <a:cs typeface="Calibri"/>
+              </a:rPr>
+              <a:t>People on the Home Ownership status ‘Other’ is at slightly higher risk than other</a:t>
+            </a:r>
+          </a:p>
+          <a:p>
+            <a:pPr marL="457200" indent="-457200">
+              <a:buFont typeface="Arial" panose="02020603050405020304" pitchFamily="18" charset="0"/>
+              <a:buChar char="•"/>
+            </a:pPr>
+            <a:r>
+              <a:rPr lang="en-US" sz="2800" dirty="0">
+                <a:latin typeface="Calibri"/>
+                <a:ea typeface="Microsoft YaHei"/>
+                <a:cs typeface="Calibri"/>
+              </a:rPr>
+              <a:t>Overall loan(including interest) : As the loan gets higher the risk increases people are higher than 50K overall payback is at high risk.</a:t>
+            </a:r>
           </a:p>
         </p:txBody>
       </p:sp>
@@ -22258,7 +23294,792 @@
 </p:sld>
 </file>
 
-<file path=ppt/slides/slide33.xml><?xml version="1.0" encoding="utf-8"?>
+<file path=ppt/slides/slide34.xml><?xml version="1.0" encoding="utf-8"?>
+<p:sld xmlns:a="http://schemas.openxmlformats.org/drawingml/2006/main" xmlns:r="http://schemas.openxmlformats.org/officeDocument/2006/relationships" xmlns:p="http://schemas.openxmlformats.org/presentationml/2006/main">
+  <p:cSld>
+    <p:spTree>
+      <p:nvGrpSpPr>
+        <p:cNvPr id="1" name=""/>
+        <p:cNvGrpSpPr/>
+        <p:nvPr/>
+      </p:nvGrpSpPr>
+      <p:grpSpPr>
+        <a:xfrm>
+          <a:off x="0" y="0"/>
+          <a:ext cx="0" cy="0"/>
+          <a:chOff x="0" y="0"/>
+          <a:chExt cx="0" cy="0"/>
+        </a:xfrm>
+      </p:grpSpPr>
+      <p:sp>
+        <p:nvSpPr>
+          <p:cNvPr id="3" name="Text Box 1">
+            <a:extLst>
+              <a:ext uri="{FF2B5EF4-FFF2-40B4-BE49-F238E27FC236}">
+                <a16:creationId xmlns:a16="http://schemas.microsoft.com/office/drawing/2014/main" id="{2F42F1D2-43A3-886D-6600-8A2FCB7F93F7}"/>
+              </a:ext>
+            </a:extLst>
+          </p:cNvPr>
+          <p:cNvSpPr txBox="1">
+            <a:spLocks noChangeArrowheads="1"/>
+          </p:cNvSpPr>
+          <p:nvPr/>
+        </p:nvSpPr>
+        <p:spPr bwMode="auto">
+          <a:xfrm>
+            <a:off x="838200" y="365125"/>
+            <a:ext cx="10515600" cy="1325563"/>
+          </a:xfrm>
+          <a:prstGeom prst="rect">
+            <a:avLst/>
+          </a:prstGeom>
+          <a:noFill/>
+          <a:ln>
+            <a:noFill/>
+          </a:ln>
+          <a:effectLst/>
+          <a:extLst>
+            <a:ext uri="{909E8E84-426E-40DD-AFC4-6F175D3DCCD1}">
+              <a14:hiddenFill xmlns:a14="http://schemas.microsoft.com/office/drawing/2010/main">
+                <a:solidFill>
+                  <a:srgbClr val="FFFFFF"/>
+                </a:solidFill>
+              </a14:hiddenFill>
+            </a:ext>
+            <a:ext uri="{91240B29-F687-4F45-9708-019B960494DF}">
+              <a14:hiddenLine xmlns:a14="http://schemas.microsoft.com/office/drawing/2010/main" w="9525" cap="flat">
+                <a:solidFill>
+                  <a:srgbClr val="3465A4"/>
+                </a:solidFill>
+                <a:round/>
+                <a:headEnd/>
+                <a:tailEnd/>
+              </a14:hiddenLine>
+            </a:ext>
+            <a:ext uri="{AF507438-7753-43E0-B8FC-AC1667EBCBE1}">
+              <a14:hiddenEffects xmlns:a14="http://schemas.microsoft.com/office/drawing/2010/main">
+                <a:effectLst>
+                  <a:outerShdw dist="35921" dir="2700000" algn="ctr" rotWithShape="0">
+                    <a:srgbClr val="808080"/>
+                  </a:outerShdw>
+                </a:effectLst>
+              </a14:hiddenEffects>
+            </a:ext>
+          </a:extLst>
+        </p:spPr>
+        <p:txBody>
+          <a:bodyPr lIns="91440" tIns="45720" rIns="91440" bIns="45720" anchor="ctr"/>
+          <a:lstStyle>
+            <a:lvl1pPr>
+              <a:tabLst>
+                <a:tab pos="0" algn="l"/>
+                <a:tab pos="914400" algn="l"/>
+                <a:tab pos="1828800" algn="l"/>
+                <a:tab pos="2743200" algn="l"/>
+                <a:tab pos="3657600" algn="l"/>
+                <a:tab pos="4572000" algn="l"/>
+                <a:tab pos="5486400" algn="l"/>
+                <a:tab pos="6400800" algn="l"/>
+                <a:tab pos="7315200" algn="l"/>
+                <a:tab pos="8229600" algn="l"/>
+                <a:tab pos="9144000" algn="l"/>
+                <a:tab pos="10058400" algn="l"/>
+                <a:tab pos="10515600" algn="l"/>
+              </a:tabLst>
+              <a:defRPr>
+                <a:solidFill>
+                  <a:srgbClr val="000000"/>
+                </a:solidFill>
+                <a:latin typeface="Calibri" panose="020F0502020204030204" pitchFamily="34" charset="0"/>
+                <a:ea typeface="Microsoft YaHei" panose="020B0503020204020204" pitchFamily="34" charset="-122"/>
+              </a:defRPr>
+            </a:lvl1pPr>
+            <a:lvl2pPr>
+              <a:tabLst>
+                <a:tab pos="0" algn="l"/>
+                <a:tab pos="914400" algn="l"/>
+                <a:tab pos="1828800" algn="l"/>
+                <a:tab pos="2743200" algn="l"/>
+                <a:tab pos="3657600" algn="l"/>
+                <a:tab pos="4572000" algn="l"/>
+                <a:tab pos="5486400" algn="l"/>
+                <a:tab pos="6400800" algn="l"/>
+                <a:tab pos="7315200" algn="l"/>
+                <a:tab pos="8229600" algn="l"/>
+                <a:tab pos="9144000" algn="l"/>
+                <a:tab pos="10058400" algn="l"/>
+                <a:tab pos="10515600" algn="l"/>
+              </a:tabLst>
+              <a:defRPr>
+                <a:solidFill>
+                  <a:srgbClr val="000000"/>
+                </a:solidFill>
+                <a:latin typeface="Calibri" panose="020F0502020204030204" pitchFamily="34" charset="0"/>
+                <a:ea typeface="Microsoft YaHei" panose="020B0503020204020204" pitchFamily="34" charset="-122"/>
+              </a:defRPr>
+            </a:lvl2pPr>
+            <a:lvl3pPr>
+              <a:tabLst>
+                <a:tab pos="0" algn="l"/>
+                <a:tab pos="914400" algn="l"/>
+                <a:tab pos="1828800" algn="l"/>
+                <a:tab pos="2743200" algn="l"/>
+                <a:tab pos="3657600" algn="l"/>
+                <a:tab pos="4572000" algn="l"/>
+                <a:tab pos="5486400" algn="l"/>
+                <a:tab pos="6400800" algn="l"/>
+                <a:tab pos="7315200" algn="l"/>
+                <a:tab pos="8229600" algn="l"/>
+                <a:tab pos="9144000" algn="l"/>
+                <a:tab pos="10058400" algn="l"/>
+                <a:tab pos="10515600" algn="l"/>
+              </a:tabLst>
+              <a:defRPr>
+                <a:solidFill>
+                  <a:srgbClr val="000000"/>
+                </a:solidFill>
+                <a:latin typeface="Calibri" panose="020F0502020204030204" pitchFamily="34" charset="0"/>
+                <a:ea typeface="Microsoft YaHei" panose="020B0503020204020204" pitchFamily="34" charset="-122"/>
+              </a:defRPr>
+            </a:lvl3pPr>
+            <a:lvl4pPr>
+              <a:tabLst>
+                <a:tab pos="0" algn="l"/>
+                <a:tab pos="914400" algn="l"/>
+                <a:tab pos="1828800" algn="l"/>
+                <a:tab pos="2743200" algn="l"/>
+                <a:tab pos="3657600" algn="l"/>
+                <a:tab pos="4572000" algn="l"/>
+                <a:tab pos="5486400" algn="l"/>
+                <a:tab pos="6400800" algn="l"/>
+                <a:tab pos="7315200" algn="l"/>
+                <a:tab pos="8229600" algn="l"/>
+                <a:tab pos="9144000" algn="l"/>
+                <a:tab pos="10058400" algn="l"/>
+                <a:tab pos="10515600" algn="l"/>
+              </a:tabLst>
+              <a:defRPr>
+                <a:solidFill>
+                  <a:srgbClr val="000000"/>
+                </a:solidFill>
+                <a:latin typeface="Calibri" panose="020F0502020204030204" pitchFamily="34" charset="0"/>
+                <a:ea typeface="Microsoft YaHei" panose="020B0503020204020204" pitchFamily="34" charset="-122"/>
+              </a:defRPr>
+            </a:lvl4pPr>
+            <a:lvl5pPr>
+              <a:tabLst>
+                <a:tab pos="0" algn="l"/>
+                <a:tab pos="914400" algn="l"/>
+                <a:tab pos="1828800" algn="l"/>
+                <a:tab pos="2743200" algn="l"/>
+                <a:tab pos="3657600" algn="l"/>
+                <a:tab pos="4572000" algn="l"/>
+                <a:tab pos="5486400" algn="l"/>
+                <a:tab pos="6400800" algn="l"/>
+                <a:tab pos="7315200" algn="l"/>
+                <a:tab pos="8229600" algn="l"/>
+                <a:tab pos="9144000" algn="l"/>
+                <a:tab pos="10058400" algn="l"/>
+                <a:tab pos="10515600" algn="l"/>
+              </a:tabLst>
+              <a:defRPr>
+                <a:solidFill>
+                  <a:srgbClr val="000000"/>
+                </a:solidFill>
+                <a:latin typeface="Calibri" panose="020F0502020204030204" pitchFamily="34" charset="0"/>
+                <a:ea typeface="Microsoft YaHei" panose="020B0503020204020204" pitchFamily="34" charset="-122"/>
+              </a:defRPr>
+            </a:lvl5pPr>
+            <a:lvl6pPr marL="2514600" indent="-228600" defTabSz="457200" eaLnBrk="0" fontAlgn="base" hangingPunct="0">
+              <a:spcBef>
+                <a:spcPts val="13"/>
+              </a:spcBef>
+              <a:spcAft>
+                <a:spcPts val="13"/>
+              </a:spcAft>
+              <a:buClr>
+                <a:srgbClr val="000000"/>
+              </a:buClr>
+              <a:buSzPct val="100000"/>
+              <a:buFont typeface="Times New Roman" panose="02020603050405020304" pitchFamily="18" charset="0"/>
+              <a:tabLst>
+                <a:tab pos="0" algn="l"/>
+                <a:tab pos="914400" algn="l"/>
+                <a:tab pos="1828800" algn="l"/>
+                <a:tab pos="2743200" algn="l"/>
+                <a:tab pos="3657600" algn="l"/>
+                <a:tab pos="4572000" algn="l"/>
+                <a:tab pos="5486400" algn="l"/>
+                <a:tab pos="6400800" algn="l"/>
+                <a:tab pos="7315200" algn="l"/>
+                <a:tab pos="8229600" algn="l"/>
+                <a:tab pos="9144000" algn="l"/>
+                <a:tab pos="10058400" algn="l"/>
+                <a:tab pos="10515600" algn="l"/>
+              </a:tabLst>
+              <a:defRPr>
+                <a:solidFill>
+                  <a:srgbClr val="000000"/>
+                </a:solidFill>
+                <a:latin typeface="Calibri" panose="020F0502020204030204" pitchFamily="34" charset="0"/>
+                <a:ea typeface="Microsoft YaHei" panose="020B0503020204020204" pitchFamily="34" charset="-122"/>
+              </a:defRPr>
+            </a:lvl6pPr>
+            <a:lvl7pPr marL="2971800" indent="-228600" defTabSz="457200" eaLnBrk="0" fontAlgn="base" hangingPunct="0">
+              <a:spcBef>
+                <a:spcPts val="13"/>
+              </a:spcBef>
+              <a:spcAft>
+                <a:spcPts val="13"/>
+              </a:spcAft>
+              <a:buClr>
+                <a:srgbClr val="000000"/>
+              </a:buClr>
+              <a:buSzPct val="100000"/>
+              <a:buFont typeface="Times New Roman" panose="02020603050405020304" pitchFamily="18" charset="0"/>
+              <a:tabLst>
+                <a:tab pos="0" algn="l"/>
+                <a:tab pos="914400" algn="l"/>
+                <a:tab pos="1828800" algn="l"/>
+                <a:tab pos="2743200" algn="l"/>
+                <a:tab pos="3657600" algn="l"/>
+                <a:tab pos="4572000" algn="l"/>
+                <a:tab pos="5486400" algn="l"/>
+                <a:tab pos="6400800" algn="l"/>
+                <a:tab pos="7315200" algn="l"/>
+                <a:tab pos="8229600" algn="l"/>
+                <a:tab pos="9144000" algn="l"/>
+                <a:tab pos="10058400" algn="l"/>
+                <a:tab pos="10515600" algn="l"/>
+              </a:tabLst>
+              <a:defRPr>
+                <a:solidFill>
+                  <a:srgbClr val="000000"/>
+                </a:solidFill>
+                <a:latin typeface="Calibri" panose="020F0502020204030204" pitchFamily="34" charset="0"/>
+                <a:ea typeface="Microsoft YaHei" panose="020B0503020204020204" pitchFamily="34" charset="-122"/>
+              </a:defRPr>
+            </a:lvl7pPr>
+            <a:lvl8pPr marL="3429000" indent="-228600" defTabSz="457200" eaLnBrk="0" fontAlgn="base" hangingPunct="0">
+              <a:spcBef>
+                <a:spcPts val="13"/>
+              </a:spcBef>
+              <a:spcAft>
+                <a:spcPts val="13"/>
+              </a:spcAft>
+              <a:buClr>
+                <a:srgbClr val="000000"/>
+              </a:buClr>
+              <a:buSzPct val="100000"/>
+              <a:buFont typeface="Times New Roman" panose="02020603050405020304" pitchFamily="18" charset="0"/>
+              <a:tabLst>
+                <a:tab pos="0" algn="l"/>
+                <a:tab pos="914400" algn="l"/>
+                <a:tab pos="1828800" algn="l"/>
+                <a:tab pos="2743200" algn="l"/>
+                <a:tab pos="3657600" algn="l"/>
+                <a:tab pos="4572000" algn="l"/>
+                <a:tab pos="5486400" algn="l"/>
+                <a:tab pos="6400800" algn="l"/>
+                <a:tab pos="7315200" algn="l"/>
+                <a:tab pos="8229600" algn="l"/>
+                <a:tab pos="9144000" algn="l"/>
+                <a:tab pos="10058400" algn="l"/>
+                <a:tab pos="10515600" algn="l"/>
+              </a:tabLst>
+              <a:defRPr>
+                <a:solidFill>
+                  <a:srgbClr val="000000"/>
+                </a:solidFill>
+                <a:latin typeface="Calibri" panose="020F0502020204030204" pitchFamily="34" charset="0"/>
+                <a:ea typeface="Microsoft YaHei" panose="020B0503020204020204" pitchFamily="34" charset="-122"/>
+              </a:defRPr>
+            </a:lvl8pPr>
+            <a:lvl9pPr marL="3886200" indent="-228600" defTabSz="457200" eaLnBrk="0" fontAlgn="base" hangingPunct="0">
+              <a:spcBef>
+                <a:spcPts val="13"/>
+              </a:spcBef>
+              <a:spcAft>
+                <a:spcPts val="13"/>
+              </a:spcAft>
+              <a:buClr>
+                <a:srgbClr val="000000"/>
+              </a:buClr>
+              <a:buSzPct val="100000"/>
+              <a:buFont typeface="Times New Roman" panose="02020603050405020304" pitchFamily="18" charset="0"/>
+              <a:tabLst>
+                <a:tab pos="0" algn="l"/>
+                <a:tab pos="914400" algn="l"/>
+                <a:tab pos="1828800" algn="l"/>
+                <a:tab pos="2743200" algn="l"/>
+                <a:tab pos="3657600" algn="l"/>
+                <a:tab pos="4572000" algn="l"/>
+                <a:tab pos="5486400" algn="l"/>
+                <a:tab pos="6400800" algn="l"/>
+                <a:tab pos="7315200" algn="l"/>
+                <a:tab pos="8229600" algn="l"/>
+                <a:tab pos="9144000" algn="l"/>
+                <a:tab pos="10058400" algn="l"/>
+                <a:tab pos="10515600" algn="l"/>
+              </a:tabLst>
+              <a:defRPr>
+                <a:solidFill>
+                  <a:srgbClr val="000000"/>
+                </a:solidFill>
+                <a:latin typeface="Calibri" panose="020F0502020204030204" pitchFamily="34" charset="0"/>
+                <a:ea typeface="Microsoft YaHei" panose="020B0503020204020204" pitchFamily="34" charset="-122"/>
+              </a:defRPr>
+            </a:lvl9pPr>
+          </a:lstStyle>
+          <a:p>
+            <a:pPr algn="ctr">
+              <a:lnSpc>
+                <a:spcPct val="90000"/>
+              </a:lnSpc>
+            </a:pPr>
+            <a:r>
+              <a:rPr lang="en-US" sz="4400" u="sng" dirty="0">
+                <a:latin typeface="Calibri"/>
+                <a:ea typeface="Microsoft YaHei"/>
+                <a:cs typeface="Calibri"/>
+              </a:rPr>
+              <a:t>Recommendation (Continued.)</a:t>
+            </a:r>
+            <a:endParaRPr lang="en-US" sz="4400" dirty="0">
+              <a:latin typeface="Calibri"/>
+              <a:ea typeface="Microsoft YaHei"/>
+              <a:cs typeface="Calibri"/>
+            </a:endParaRPr>
+          </a:p>
+        </p:txBody>
+      </p:sp>
+      <p:sp>
+        <p:nvSpPr>
+          <p:cNvPr id="4" name="Text Box 2">
+            <a:extLst>
+              <a:ext uri="{FF2B5EF4-FFF2-40B4-BE49-F238E27FC236}">
+                <a16:creationId xmlns:a16="http://schemas.microsoft.com/office/drawing/2014/main" id="{EBE0255E-E601-8D89-E928-A3E9AA9C3429}"/>
+              </a:ext>
+            </a:extLst>
+          </p:cNvPr>
+          <p:cNvSpPr txBox="1">
+            <a:spLocks noChangeArrowheads="1"/>
+          </p:cNvSpPr>
+          <p:nvPr/>
+        </p:nvSpPr>
+        <p:spPr bwMode="auto">
+          <a:xfrm>
+            <a:off x="838200" y="1711763"/>
+            <a:ext cx="10515600" cy="4351338"/>
+          </a:xfrm>
+          <a:prstGeom prst="rect">
+            <a:avLst/>
+          </a:prstGeom>
+          <a:noFill/>
+          <a:ln>
+            <a:noFill/>
+          </a:ln>
+          <a:effectLst/>
+          <a:extLst>
+            <a:ext uri="{909E8E84-426E-40DD-AFC4-6F175D3DCCD1}">
+              <a14:hiddenFill xmlns:a14="http://schemas.microsoft.com/office/drawing/2010/main">
+                <a:solidFill>
+                  <a:srgbClr val="FFFFFF"/>
+                </a:solidFill>
+              </a14:hiddenFill>
+            </a:ext>
+            <a:ext uri="{91240B29-F687-4F45-9708-019B960494DF}">
+              <a14:hiddenLine xmlns:a14="http://schemas.microsoft.com/office/drawing/2010/main" w="9525" cap="flat">
+                <a:solidFill>
+                  <a:srgbClr val="3465A4"/>
+                </a:solidFill>
+                <a:round/>
+                <a:headEnd/>
+                <a:tailEnd/>
+              </a14:hiddenLine>
+            </a:ext>
+            <a:ext uri="{AF507438-7753-43E0-B8FC-AC1667EBCBE1}">
+              <a14:hiddenEffects xmlns:a14="http://schemas.microsoft.com/office/drawing/2010/main">
+                <a:effectLst>
+                  <a:outerShdw dist="35921" dir="2700000" algn="ctr" rotWithShape="0">
+                    <a:srgbClr val="808080"/>
+                  </a:outerShdw>
+                </a:effectLst>
+              </a14:hiddenEffects>
+            </a:ext>
+          </a:extLst>
+        </p:spPr>
+        <p:txBody>
+          <a:bodyPr lIns="91440" tIns="45720" rIns="91440" bIns="45720" anchor="t"/>
+          <a:lstStyle>
+            <a:lvl1pPr marL="228600" indent="-228600">
+              <a:tabLst>
+                <a:tab pos="914400" algn="l"/>
+                <a:tab pos="1828800" algn="l"/>
+                <a:tab pos="2743200" algn="l"/>
+                <a:tab pos="3657600" algn="l"/>
+                <a:tab pos="4572000" algn="l"/>
+                <a:tab pos="5486400" algn="l"/>
+                <a:tab pos="6400800" algn="l"/>
+                <a:tab pos="7315200" algn="l"/>
+                <a:tab pos="8229600" algn="l"/>
+                <a:tab pos="9144000" algn="l"/>
+                <a:tab pos="10058400" algn="l"/>
+                <a:tab pos="10515600" algn="l"/>
+              </a:tabLst>
+              <a:defRPr>
+                <a:solidFill>
+                  <a:srgbClr val="000000"/>
+                </a:solidFill>
+                <a:latin typeface="Calibri" panose="020F0502020204030204" pitchFamily="34" charset="0"/>
+                <a:ea typeface="Microsoft YaHei" panose="020B0503020204020204" pitchFamily="34" charset="-122"/>
+              </a:defRPr>
+            </a:lvl1pPr>
+            <a:lvl2pPr>
+              <a:tabLst>
+                <a:tab pos="914400" algn="l"/>
+                <a:tab pos="1828800" algn="l"/>
+                <a:tab pos="2743200" algn="l"/>
+                <a:tab pos="3657600" algn="l"/>
+                <a:tab pos="4572000" algn="l"/>
+                <a:tab pos="5486400" algn="l"/>
+                <a:tab pos="6400800" algn="l"/>
+                <a:tab pos="7315200" algn="l"/>
+                <a:tab pos="8229600" algn="l"/>
+                <a:tab pos="9144000" algn="l"/>
+                <a:tab pos="10058400" algn="l"/>
+                <a:tab pos="10515600" algn="l"/>
+              </a:tabLst>
+              <a:defRPr>
+                <a:solidFill>
+                  <a:srgbClr val="000000"/>
+                </a:solidFill>
+                <a:latin typeface="Calibri" panose="020F0502020204030204" pitchFamily="34" charset="0"/>
+                <a:ea typeface="Microsoft YaHei" panose="020B0503020204020204" pitchFamily="34" charset="-122"/>
+              </a:defRPr>
+            </a:lvl2pPr>
+            <a:lvl3pPr>
+              <a:tabLst>
+                <a:tab pos="914400" algn="l"/>
+                <a:tab pos="1828800" algn="l"/>
+                <a:tab pos="2743200" algn="l"/>
+                <a:tab pos="3657600" algn="l"/>
+                <a:tab pos="4572000" algn="l"/>
+                <a:tab pos="5486400" algn="l"/>
+                <a:tab pos="6400800" algn="l"/>
+                <a:tab pos="7315200" algn="l"/>
+                <a:tab pos="8229600" algn="l"/>
+                <a:tab pos="9144000" algn="l"/>
+                <a:tab pos="10058400" algn="l"/>
+                <a:tab pos="10515600" algn="l"/>
+              </a:tabLst>
+              <a:defRPr>
+                <a:solidFill>
+                  <a:srgbClr val="000000"/>
+                </a:solidFill>
+                <a:latin typeface="Calibri" panose="020F0502020204030204" pitchFamily="34" charset="0"/>
+                <a:ea typeface="Microsoft YaHei" panose="020B0503020204020204" pitchFamily="34" charset="-122"/>
+              </a:defRPr>
+            </a:lvl3pPr>
+            <a:lvl4pPr>
+              <a:tabLst>
+                <a:tab pos="914400" algn="l"/>
+                <a:tab pos="1828800" algn="l"/>
+                <a:tab pos="2743200" algn="l"/>
+                <a:tab pos="3657600" algn="l"/>
+                <a:tab pos="4572000" algn="l"/>
+                <a:tab pos="5486400" algn="l"/>
+                <a:tab pos="6400800" algn="l"/>
+                <a:tab pos="7315200" algn="l"/>
+                <a:tab pos="8229600" algn="l"/>
+                <a:tab pos="9144000" algn="l"/>
+                <a:tab pos="10058400" algn="l"/>
+                <a:tab pos="10515600" algn="l"/>
+              </a:tabLst>
+              <a:defRPr>
+                <a:solidFill>
+                  <a:srgbClr val="000000"/>
+                </a:solidFill>
+                <a:latin typeface="Calibri" panose="020F0502020204030204" pitchFamily="34" charset="0"/>
+                <a:ea typeface="Microsoft YaHei" panose="020B0503020204020204" pitchFamily="34" charset="-122"/>
+              </a:defRPr>
+            </a:lvl4pPr>
+            <a:lvl5pPr>
+              <a:tabLst>
+                <a:tab pos="914400" algn="l"/>
+                <a:tab pos="1828800" algn="l"/>
+                <a:tab pos="2743200" algn="l"/>
+                <a:tab pos="3657600" algn="l"/>
+                <a:tab pos="4572000" algn="l"/>
+                <a:tab pos="5486400" algn="l"/>
+                <a:tab pos="6400800" algn="l"/>
+                <a:tab pos="7315200" algn="l"/>
+                <a:tab pos="8229600" algn="l"/>
+                <a:tab pos="9144000" algn="l"/>
+                <a:tab pos="10058400" algn="l"/>
+                <a:tab pos="10515600" algn="l"/>
+              </a:tabLst>
+              <a:defRPr>
+                <a:solidFill>
+                  <a:srgbClr val="000000"/>
+                </a:solidFill>
+                <a:latin typeface="Calibri" panose="020F0502020204030204" pitchFamily="34" charset="0"/>
+                <a:ea typeface="Microsoft YaHei" panose="020B0503020204020204" pitchFamily="34" charset="-122"/>
+              </a:defRPr>
+            </a:lvl5pPr>
+            <a:lvl6pPr marL="2514600" indent="-228600" defTabSz="457200" eaLnBrk="0" fontAlgn="base" hangingPunct="0">
+              <a:spcBef>
+                <a:spcPts val="13"/>
+              </a:spcBef>
+              <a:spcAft>
+                <a:spcPts val="13"/>
+              </a:spcAft>
+              <a:buClr>
+                <a:srgbClr val="000000"/>
+              </a:buClr>
+              <a:buSzPct val="100000"/>
+              <a:buFont typeface="Times New Roman" panose="02020603050405020304" pitchFamily="18" charset="0"/>
+              <a:tabLst>
+                <a:tab pos="914400" algn="l"/>
+                <a:tab pos="1828800" algn="l"/>
+                <a:tab pos="2743200" algn="l"/>
+                <a:tab pos="3657600" algn="l"/>
+                <a:tab pos="4572000" algn="l"/>
+                <a:tab pos="5486400" algn="l"/>
+                <a:tab pos="6400800" algn="l"/>
+                <a:tab pos="7315200" algn="l"/>
+                <a:tab pos="8229600" algn="l"/>
+                <a:tab pos="9144000" algn="l"/>
+                <a:tab pos="10058400" algn="l"/>
+                <a:tab pos="10515600" algn="l"/>
+              </a:tabLst>
+              <a:defRPr>
+                <a:solidFill>
+                  <a:srgbClr val="000000"/>
+                </a:solidFill>
+                <a:latin typeface="Calibri" panose="020F0502020204030204" pitchFamily="34" charset="0"/>
+                <a:ea typeface="Microsoft YaHei" panose="020B0503020204020204" pitchFamily="34" charset="-122"/>
+              </a:defRPr>
+            </a:lvl6pPr>
+            <a:lvl7pPr marL="2971800" indent="-228600" defTabSz="457200" eaLnBrk="0" fontAlgn="base" hangingPunct="0">
+              <a:spcBef>
+                <a:spcPts val="13"/>
+              </a:spcBef>
+              <a:spcAft>
+                <a:spcPts val="13"/>
+              </a:spcAft>
+              <a:buClr>
+                <a:srgbClr val="000000"/>
+              </a:buClr>
+              <a:buSzPct val="100000"/>
+              <a:buFont typeface="Times New Roman" panose="02020603050405020304" pitchFamily="18" charset="0"/>
+              <a:tabLst>
+                <a:tab pos="914400" algn="l"/>
+                <a:tab pos="1828800" algn="l"/>
+                <a:tab pos="2743200" algn="l"/>
+                <a:tab pos="3657600" algn="l"/>
+                <a:tab pos="4572000" algn="l"/>
+                <a:tab pos="5486400" algn="l"/>
+                <a:tab pos="6400800" algn="l"/>
+                <a:tab pos="7315200" algn="l"/>
+                <a:tab pos="8229600" algn="l"/>
+                <a:tab pos="9144000" algn="l"/>
+                <a:tab pos="10058400" algn="l"/>
+                <a:tab pos="10515600" algn="l"/>
+              </a:tabLst>
+              <a:defRPr>
+                <a:solidFill>
+                  <a:srgbClr val="000000"/>
+                </a:solidFill>
+                <a:latin typeface="Calibri" panose="020F0502020204030204" pitchFamily="34" charset="0"/>
+                <a:ea typeface="Microsoft YaHei" panose="020B0503020204020204" pitchFamily="34" charset="-122"/>
+              </a:defRPr>
+            </a:lvl7pPr>
+            <a:lvl8pPr marL="3429000" indent="-228600" defTabSz="457200" eaLnBrk="0" fontAlgn="base" hangingPunct="0">
+              <a:spcBef>
+                <a:spcPts val="13"/>
+              </a:spcBef>
+              <a:spcAft>
+                <a:spcPts val="13"/>
+              </a:spcAft>
+              <a:buClr>
+                <a:srgbClr val="000000"/>
+              </a:buClr>
+              <a:buSzPct val="100000"/>
+              <a:buFont typeface="Times New Roman" panose="02020603050405020304" pitchFamily="18" charset="0"/>
+              <a:tabLst>
+                <a:tab pos="914400" algn="l"/>
+                <a:tab pos="1828800" algn="l"/>
+                <a:tab pos="2743200" algn="l"/>
+                <a:tab pos="3657600" algn="l"/>
+                <a:tab pos="4572000" algn="l"/>
+                <a:tab pos="5486400" algn="l"/>
+                <a:tab pos="6400800" algn="l"/>
+                <a:tab pos="7315200" algn="l"/>
+                <a:tab pos="8229600" algn="l"/>
+                <a:tab pos="9144000" algn="l"/>
+                <a:tab pos="10058400" algn="l"/>
+                <a:tab pos="10515600" algn="l"/>
+              </a:tabLst>
+              <a:defRPr>
+                <a:solidFill>
+                  <a:srgbClr val="000000"/>
+                </a:solidFill>
+                <a:latin typeface="Calibri" panose="020F0502020204030204" pitchFamily="34" charset="0"/>
+                <a:ea typeface="Microsoft YaHei" panose="020B0503020204020204" pitchFamily="34" charset="-122"/>
+              </a:defRPr>
+            </a:lvl8pPr>
+            <a:lvl9pPr marL="3886200" indent="-228600" defTabSz="457200" eaLnBrk="0" fontAlgn="base" hangingPunct="0">
+              <a:spcBef>
+                <a:spcPts val="13"/>
+              </a:spcBef>
+              <a:spcAft>
+                <a:spcPts val="13"/>
+              </a:spcAft>
+              <a:buClr>
+                <a:srgbClr val="000000"/>
+              </a:buClr>
+              <a:buSzPct val="100000"/>
+              <a:buFont typeface="Times New Roman" panose="02020603050405020304" pitchFamily="18" charset="0"/>
+              <a:tabLst>
+                <a:tab pos="914400" algn="l"/>
+                <a:tab pos="1828800" algn="l"/>
+                <a:tab pos="2743200" algn="l"/>
+                <a:tab pos="3657600" algn="l"/>
+                <a:tab pos="4572000" algn="l"/>
+                <a:tab pos="5486400" algn="l"/>
+                <a:tab pos="6400800" algn="l"/>
+                <a:tab pos="7315200" algn="l"/>
+                <a:tab pos="8229600" algn="l"/>
+                <a:tab pos="9144000" algn="l"/>
+                <a:tab pos="10058400" algn="l"/>
+                <a:tab pos="10515600" algn="l"/>
+              </a:tabLst>
+              <a:defRPr>
+                <a:solidFill>
+                  <a:srgbClr val="000000"/>
+                </a:solidFill>
+                <a:latin typeface="Calibri" panose="020F0502020204030204" pitchFamily="34" charset="0"/>
+                <a:ea typeface="Microsoft YaHei" panose="020B0503020204020204" pitchFamily="34" charset="-122"/>
+              </a:defRPr>
+            </a:lvl9pPr>
+          </a:lstStyle>
+          <a:p>
+            <a:pPr marL="457200" indent="-457200">
+              <a:buFont typeface="Arial" panose="02020603050405020304" pitchFamily="18" charset="0"/>
+              <a:buChar char="•"/>
+            </a:pPr>
+            <a:r>
+              <a:rPr lang="en-US" sz="2800" dirty="0">
+                <a:latin typeface="Calibri"/>
+                <a:ea typeface="Microsoft YaHei"/>
+                <a:cs typeface="Calibri"/>
+              </a:rPr>
+              <a:t>People with open credit lines of 30-40 are at higher risk </a:t>
+            </a:r>
+            <a:endParaRPr lang="en-US">
+              <a:latin typeface="Calibri"/>
+              <a:ea typeface="Microsoft YaHei"/>
+              <a:cs typeface="Calibri"/>
+            </a:endParaRPr>
+          </a:p>
+          <a:p>
+            <a:pPr marL="457200" indent="-457200">
+              <a:buFont typeface="Arial" panose="02020603050405020304" pitchFamily="18" charset="0"/>
+              <a:buChar char="•"/>
+            </a:pPr>
+            <a:r>
+              <a:rPr lang="en-US" sz="2800" dirty="0">
+                <a:latin typeface="Calibri"/>
+                <a:ea typeface="Microsoft YaHei"/>
+                <a:cs typeface="Calibri"/>
+              </a:rPr>
+              <a:t>Smaller business is at higher risk of defaulting</a:t>
+            </a:r>
+            <a:endParaRPr lang="en-US" dirty="0">
+              <a:cs typeface="Calibri" panose="020F0502020204030204" pitchFamily="34" charset="0"/>
+            </a:endParaRPr>
+          </a:p>
+          <a:p>
+            <a:pPr marL="457200" indent="-457200">
+              <a:buFont typeface="Arial" panose="02020603050405020304" pitchFamily="18" charset="0"/>
+              <a:buChar char="•"/>
+            </a:pPr>
+            <a:r>
+              <a:rPr lang="en-US" sz="2800" dirty="0">
+                <a:latin typeface="Calibri"/>
+                <a:ea typeface="Microsoft YaHei"/>
+                <a:cs typeface="Calibri"/>
+              </a:rPr>
+              <a:t>As the revolving line utilization increases the risk of defaulting increases</a:t>
+            </a:r>
+            <a:endParaRPr lang="en-US" dirty="0">
+              <a:cs typeface="Calibri" panose="020F0502020204030204" pitchFamily="34" charset="0"/>
+            </a:endParaRPr>
+          </a:p>
+          <a:p>
+            <a:pPr marL="457200" indent="-457200">
+              <a:buFont typeface="Arial" panose="02020603050405020304" pitchFamily="18" charset="0"/>
+              <a:buChar char="•"/>
+            </a:pPr>
+            <a:r>
+              <a:rPr lang="en-US" sz="2800" dirty="0">
+                <a:latin typeface="Calibri"/>
+                <a:ea typeface="Microsoft YaHei"/>
+                <a:cs typeface="Calibri"/>
+              </a:rPr>
+              <a:t>As the ratio of income to debt gets closer the risk of defaulting gets higher.</a:t>
+            </a:r>
+          </a:p>
+          <a:p>
+            <a:pPr marL="457200" indent="-457200">
+              <a:buFont typeface="Arial" panose="02020603050405020304" pitchFamily="18" charset="0"/>
+              <a:buChar char="•"/>
+            </a:pPr>
+            <a:r>
+              <a:rPr lang="en-US" sz="2800" dirty="0">
+                <a:latin typeface="Calibri"/>
+                <a:ea typeface="Microsoft YaHei"/>
+                <a:cs typeface="Calibri"/>
+              </a:rPr>
+              <a:t>It's recommended to introduce an point based system to assess the risk of being </a:t>
+            </a:r>
+            <a:r>
+              <a:rPr lang="en-US" sz="2800" dirty="0" err="1">
+                <a:latin typeface="Calibri"/>
+                <a:ea typeface="Microsoft YaHei"/>
+                <a:cs typeface="Calibri"/>
+              </a:rPr>
+              <a:t>defualted</a:t>
+            </a:r>
+            <a:r>
+              <a:rPr lang="en-US" sz="2800" dirty="0">
+                <a:latin typeface="Calibri"/>
+                <a:ea typeface="Microsoft YaHei"/>
+                <a:cs typeface="Calibri"/>
+              </a:rPr>
+              <a:t> </a:t>
+            </a:r>
+            <a:endParaRPr lang="en-US" sz="2800" dirty="0">
+              <a:cs typeface="Calibri" panose="020F0502020204030204" pitchFamily="34" charset="0"/>
+            </a:endParaRPr>
+          </a:p>
+        </p:txBody>
+      </p:sp>
+    </p:spTree>
+    <p:extLst>
+      <p:ext uri="{BB962C8B-B14F-4D97-AF65-F5344CB8AC3E}">
+        <p14:creationId xmlns:p14="http://schemas.microsoft.com/office/powerpoint/2010/main" val="3458464380"/>
+      </p:ext>
+    </p:extLst>
+  </p:cSld>
+  <p:clrMapOvr>
+    <a:masterClrMapping/>
+  </p:clrMapOvr>
+</p:sld>
+</file>
+
+<file path=ppt/slides/slide35.xml><?xml version="1.0" encoding="utf-8"?>
 <p:sld xmlns:a="http://schemas.openxmlformats.org/drawingml/2006/main" xmlns:r="http://schemas.openxmlformats.org/officeDocument/2006/relationships" xmlns:p="http://schemas.openxmlformats.org/presentationml/2006/main">
   <p:cSld>
     <p:bg>
@@ -23450,7 +25271,7 @@
 </p:sld>
 </file>
 
-<file path=ppt/slides/slide34.xml><?xml version="1.0" encoding="utf-8"?>
+<file path=ppt/slides/slide36.xml><?xml version="1.0" encoding="utf-8"?>
 <p:sld xmlns:a="http://schemas.openxmlformats.org/drawingml/2006/main" xmlns:r="http://schemas.openxmlformats.org/officeDocument/2006/relationships" xmlns:p="http://schemas.openxmlformats.org/presentationml/2006/main">
   <p:cSld>
     <p:bg>

</xml_diff>